<commit_message>
not much to add
</commit_message>
<xml_diff>
--- a/milestone/Epileptic Seizure Prediction Mile Stone Presentation.pptx
+++ b/milestone/Epileptic Seizure Prediction Mile Stone Presentation.pptx
@@ -215,7 +215,7 @@
           <a:p>
             <a:fld id="{13BC9EFF-03FA-4E49-8EBC-CB31F1BDD1FD}" type="datetimeFigureOut">
               <a:rPr lang="en-US" smtClean="0"/>
-              <a:t>10/27/2014</a:t>
+              <a:t>10/28/2014</a:t>
             </a:fld>
             <a:endParaRPr lang="en-US"/>
           </a:p>
@@ -743,7 +743,7 @@
           <a:p>
             <a:fld id="{E0F39512-80BE-4684-B50E-AA8CBBEB6411}" type="datetime1">
               <a:rPr lang="en-US" smtClean="0"/>
-              <a:t>10/27/2014</a:t>
+              <a:t>10/28/2014</a:t>
             </a:fld>
             <a:endParaRPr lang="en-US"/>
           </a:p>
@@ -913,7 +913,7 @@
           <a:p>
             <a:fld id="{4FE7B91A-6E28-435A-BAD8-9769FAA0794D}" type="datetime1">
               <a:rPr lang="en-US" smtClean="0"/>
-              <a:t>10/27/2014</a:t>
+              <a:t>10/28/2014</a:t>
             </a:fld>
             <a:endParaRPr lang="en-US"/>
           </a:p>
@@ -1136,7 +1136,7 @@
           <a:p>
             <a:fld id="{9502BDEB-F55D-4018-BC84-C800CAA54851}" type="datetime1">
               <a:rPr lang="en-US" smtClean="0"/>
-              <a:t>10/27/2014</a:t>
+              <a:t>10/28/2014</a:t>
             </a:fld>
             <a:endParaRPr lang="en-US"/>
           </a:p>
@@ -1316,7 +1316,7 @@
           <a:p>
             <a:fld id="{56CD71B1-0BC6-41A6-816E-6139441584D7}" type="datetime1">
               <a:rPr lang="en-US" smtClean="0"/>
-              <a:t>10/27/2014</a:t>
+              <a:t>10/28/2014</a:t>
             </a:fld>
             <a:endParaRPr lang="en-US"/>
           </a:p>
@@ -1617,7 +1617,7 @@
           <a:p>
             <a:fld id="{ACC09AF0-A991-4E6E-AE35-8440A5B26C30}" type="datetime1">
               <a:rPr lang="en-US" smtClean="0"/>
-              <a:t>10/27/2014</a:t>
+              <a:t>10/28/2014</a:t>
             </a:fld>
             <a:endParaRPr lang="en-US"/>
           </a:p>
@@ -1921,7 +1921,7 @@
           <a:p>
             <a:fld id="{57BDDD9D-06E9-4F10-9404-6614A0E58CA6}" type="datetime1">
               <a:rPr lang="en-US" smtClean="0"/>
-              <a:t>10/27/2014</a:t>
+              <a:t>10/28/2014</a:t>
             </a:fld>
             <a:endParaRPr lang="en-US"/>
           </a:p>
@@ -2343,7 +2343,7 @@
           <a:p>
             <a:fld id="{C00EF818-D1F0-43A1-BBFE-483DAC8507B7}" type="datetime1">
               <a:rPr lang="en-US" smtClean="0"/>
-              <a:t>10/27/2014</a:t>
+              <a:t>10/28/2014</a:t>
             </a:fld>
             <a:endParaRPr lang="en-US"/>
           </a:p>
@@ -2461,7 +2461,7 @@
           <a:p>
             <a:fld id="{BF87FF4E-0114-42F9-A1F9-C8C12C2D65E6}" type="datetime1">
               <a:rPr lang="en-US" smtClean="0"/>
-              <a:t>10/27/2014</a:t>
+              <a:t>10/28/2014</a:t>
             </a:fld>
             <a:endParaRPr lang="en-US"/>
           </a:p>
@@ -2556,7 +2556,7 @@
           <a:p>
             <a:fld id="{8235F31E-A95A-4ACE-A7B3-DDF4EA92F051}" type="datetime1">
               <a:rPr lang="en-US" smtClean="0"/>
-              <a:t>10/27/2014</a:t>
+              <a:t>10/28/2014</a:t>
             </a:fld>
             <a:endParaRPr lang="en-US"/>
           </a:p>
@@ -2829,7 +2829,7 @@
           <a:p>
             <a:fld id="{2C5C2A78-F15C-480A-9FBA-24DF59B9E5D9}" type="datetime1">
               <a:rPr lang="en-US" smtClean="0"/>
-              <a:t>10/27/2014</a:t>
+              <a:t>10/28/2014</a:t>
             </a:fld>
             <a:endParaRPr lang="en-US"/>
           </a:p>
@@ -3094,7 +3094,7 @@
           <a:p>
             <a:fld id="{00E313FE-467C-4502-8FFA-C1662E15C0A8}" type="datetime1">
               <a:rPr lang="en-US" smtClean="0"/>
-              <a:t>10/27/2014</a:t>
+              <a:t>10/28/2014</a:t>
             </a:fld>
             <a:endParaRPr lang="en-US"/>
           </a:p>
@@ -3343,7 +3343,7 @@
           <a:p>
             <a:fld id="{DDC62013-0883-4074-A9BC-6B2D77A1FECA}" type="datetime1">
               <a:rPr lang="en-US" smtClean="0"/>
-              <a:t>10/27/2014</a:t>
+              <a:t>10/28/2014</a:t>
             </a:fld>
             <a:endParaRPr lang="en-US"/>
           </a:p>
@@ -5243,12 +5243,12 @@
           </a:p>
           <a:p>
             <a:r>
-              <a:rPr lang="en-US" sz="2000" dirty="0"/>
+              <a:rPr lang="en-US" sz="2000"/>
               <a:t>-</a:t>
             </a:r>
             <a:r>
-              <a:rPr lang="en-US" sz="2000" dirty="0" smtClean="0"/>
-              <a:t>Murray </a:t>
+              <a:rPr lang="en-US" sz="2000" smtClean="0"/>
+              <a:t>Murray, </a:t>
             </a:r>
             <a:r>
               <a:rPr lang="en-US" sz="2000" dirty="0"/>

</xml_diff>